<commit_message>
Functional Verified Conv Format 1, See Commit Log for more details
</commit_message>
<xml_diff>
--- a/hardware/doc/CNN Accelerator Implementation Plan.pptx
+++ b/hardware/doc/CNN Accelerator Implementation Plan.pptx
@@ -5,7 +5,7 @@
     <p:sldMasterId id="2147483696" r:id="rId1"/>
   </p:sldMasterIdLst>
   <p:notesMasterIdLst>
-    <p:notesMasterId r:id="rId44"/>
+    <p:notesMasterId r:id="rId45"/>
   </p:notesMasterIdLst>
   <p:sldIdLst>
     <p:sldId id="256" r:id="rId2"/>
@@ -50,6 +50,7 @@
     <p:sldId id="300" r:id="rId41"/>
     <p:sldId id="287" r:id="rId42"/>
     <p:sldId id="288" r:id="rId43"/>
+    <p:sldId id="301" r:id="rId44"/>
   </p:sldIdLst>
   <p:sldSz cx="9144000" cy="5143500" type="screen16x9"/>
   <p:notesSz cx="6858000" cy="9144000"/>
@@ -238,7 +239,7 @@
           <a:p>
             <a:fld id="{C4B376D1-B2A4-4962-9EC9-A9C8ACD38F22}" type="datetimeFigureOut">
               <a:rPr lang="en-US" smtClean="0"/>
-              <a:t>4/26/2019</a:t>
+              <a:t>4/27/2019</a:t>
             </a:fld>
             <a:endParaRPr lang="en-US"/>
           </a:p>
@@ -1056,7 +1057,7 @@
           <a:p>
             <a:fld id="{8F06087A-BB81-43C1-AFE2-3763E6B27B9D}" type="datetimeFigureOut">
               <a:rPr lang="en-US" smtClean="0"/>
-              <a:t>4/26/2019</a:t>
+              <a:t>4/27/2019</a:t>
             </a:fld>
             <a:endParaRPr lang="en-US"/>
           </a:p>
@@ -1226,7 +1227,7 @@
           <a:p>
             <a:fld id="{8F06087A-BB81-43C1-AFE2-3763E6B27B9D}" type="datetimeFigureOut">
               <a:rPr lang="en-US" smtClean="0"/>
-              <a:t>4/26/2019</a:t>
+              <a:t>4/27/2019</a:t>
             </a:fld>
             <a:endParaRPr lang="en-US"/>
           </a:p>
@@ -1406,7 +1407,7 @@
           <a:p>
             <a:fld id="{8F06087A-BB81-43C1-AFE2-3763E6B27B9D}" type="datetimeFigureOut">
               <a:rPr lang="en-US" smtClean="0"/>
-              <a:t>4/26/2019</a:t>
+              <a:t>4/27/2019</a:t>
             </a:fld>
             <a:endParaRPr lang="en-US"/>
           </a:p>
@@ -1576,7 +1577,7 @@
           <a:p>
             <a:fld id="{8F06087A-BB81-43C1-AFE2-3763E6B27B9D}" type="datetimeFigureOut">
               <a:rPr lang="en-US" smtClean="0"/>
-              <a:t>4/26/2019</a:t>
+              <a:t>4/27/2019</a:t>
             </a:fld>
             <a:endParaRPr lang="en-US"/>
           </a:p>
@@ -1822,7 +1823,7 @@
           <a:p>
             <a:fld id="{8F06087A-BB81-43C1-AFE2-3763E6B27B9D}" type="datetimeFigureOut">
               <a:rPr lang="en-US" smtClean="0"/>
-              <a:t>4/26/2019</a:t>
+              <a:t>4/27/2019</a:t>
             </a:fld>
             <a:endParaRPr lang="en-US"/>
           </a:p>
@@ -2054,7 +2055,7 @@
           <a:p>
             <a:fld id="{8F06087A-BB81-43C1-AFE2-3763E6B27B9D}" type="datetimeFigureOut">
               <a:rPr lang="en-US" smtClean="0"/>
-              <a:t>4/26/2019</a:t>
+              <a:t>4/27/2019</a:t>
             </a:fld>
             <a:endParaRPr lang="en-US"/>
           </a:p>
@@ -2421,7 +2422,7 @@
           <a:p>
             <a:fld id="{8F06087A-BB81-43C1-AFE2-3763E6B27B9D}" type="datetimeFigureOut">
               <a:rPr lang="en-US" smtClean="0"/>
-              <a:t>4/26/2019</a:t>
+              <a:t>4/27/2019</a:t>
             </a:fld>
             <a:endParaRPr lang="en-US"/>
           </a:p>
@@ -2539,7 +2540,7 @@
           <a:p>
             <a:fld id="{8F06087A-BB81-43C1-AFE2-3763E6B27B9D}" type="datetimeFigureOut">
               <a:rPr lang="en-US" smtClean="0"/>
-              <a:t>4/26/2019</a:t>
+              <a:t>4/27/2019</a:t>
             </a:fld>
             <a:endParaRPr lang="en-US"/>
           </a:p>
@@ -2634,7 +2635,7 @@
           <a:p>
             <a:fld id="{8F06087A-BB81-43C1-AFE2-3763E6B27B9D}" type="datetimeFigureOut">
               <a:rPr lang="en-US" smtClean="0"/>
-              <a:t>4/26/2019</a:t>
+              <a:t>4/27/2019</a:t>
             </a:fld>
             <a:endParaRPr lang="en-US"/>
           </a:p>
@@ -2911,7 +2912,7 @@
           <a:p>
             <a:fld id="{8F06087A-BB81-43C1-AFE2-3763E6B27B9D}" type="datetimeFigureOut">
               <a:rPr lang="en-US" smtClean="0"/>
-              <a:t>4/26/2019</a:t>
+              <a:t>4/27/2019</a:t>
             </a:fld>
             <a:endParaRPr lang="en-US"/>
           </a:p>
@@ -3168,7 +3169,7 @@
           <a:p>
             <a:fld id="{8F06087A-BB81-43C1-AFE2-3763E6B27B9D}" type="datetimeFigureOut">
               <a:rPr lang="en-US" smtClean="0"/>
-              <a:t>4/26/2019</a:t>
+              <a:t>4/27/2019</a:t>
             </a:fld>
             <a:endParaRPr lang="en-US"/>
           </a:p>
@@ -3381,7 +3382,7 @@
           <a:p>
             <a:fld id="{8F06087A-BB81-43C1-AFE2-3763E6B27B9D}" type="datetimeFigureOut">
               <a:rPr lang="en-US" smtClean="0"/>
-              <a:t>4/26/2019</a:t>
+              <a:t>4/27/2019</a:t>
             </a:fld>
             <a:endParaRPr lang="en-US"/>
           </a:p>
@@ -37571,85 +37572,6 @@
           </a:p>
           <a:p>
             <a:pPr lvl="1"/>
-            <a:r>
-              <a:rPr lang="pt-BR" dirty="0"/>
-              <a:t>[D</a:t>
-            </a:r>
-            <a:r>
-              <a:rPr lang="pt-BR" baseline="-25000" dirty="0"/>
-              <a:t>0</a:t>
-            </a:r>
-            <a:r>
-              <a:rPr lang="pt-BR" dirty="0"/>
-              <a:t>C</a:t>
-            </a:r>
-            <a:r>
-              <a:rPr lang="pt-BR" baseline="-25000" dirty="0"/>
-              <a:t>0</a:t>
-            </a:r>
-            <a:r>
-              <a:rPr lang="pt-BR" dirty="0"/>
-              <a:t>R</a:t>
-            </a:r>
-            <a:r>
-              <a:rPr lang="pt-BR" baseline="-25000" dirty="0"/>
-              <a:t>0</a:t>
-            </a:r>
-            <a:r>
-              <a:rPr lang="pt-BR" dirty="0"/>
-              <a:t>, D</a:t>
-            </a:r>
-            <a:r>
-              <a:rPr lang="pt-BR" baseline="-25000" dirty="0"/>
-              <a:t>1</a:t>
-            </a:r>
-            <a:r>
-              <a:rPr lang="pt-BR" dirty="0"/>
-              <a:t>C</a:t>
-            </a:r>
-            <a:r>
-              <a:rPr lang="pt-BR" baseline="-25000" dirty="0"/>
-              <a:t>0</a:t>
-            </a:r>
-            <a:r>
-              <a:rPr lang="pt-BR" dirty="0"/>
-              <a:t>R</a:t>
-            </a:r>
-            <a:r>
-              <a:rPr lang="pt-BR" baseline="-25000" dirty="0"/>
-              <a:t>0</a:t>
-            </a:r>
-            <a:r>
-              <a:rPr lang="pt-BR" dirty="0"/>
-              <a:t>, ... D</a:t>
-            </a:r>
-            <a:r>
-              <a:rPr lang="pt-BR" baseline="-25000" dirty="0"/>
-              <a:t>7</a:t>
-            </a:r>
-            <a:r>
-              <a:rPr lang="pt-BR" dirty="0"/>
-              <a:t>C</a:t>
-            </a:r>
-            <a:r>
-              <a:rPr lang="pt-BR" baseline="-25000" dirty="0"/>
-              <a:t>0</a:t>
-            </a:r>
-            <a:r>
-              <a:rPr lang="pt-BR" dirty="0"/>
-              <a:t>R</a:t>
-            </a:r>
-            <a:r>
-              <a:rPr lang="pt-BR" baseline="-25000" dirty="0"/>
-              <a:t>0</a:t>
-            </a:r>
-            <a:r>
-              <a:rPr lang="pt-BR" dirty="0"/>
-              <a:t>]</a:t>
-            </a:r>
-            <a:endParaRPr lang="en-US" dirty="0"/>
-          </a:p>
-          <a:p>
             <a:endParaRPr lang="en-US" dirty="0"/>
           </a:p>
         </p:txBody>
@@ -38035,7 +37957,15 @@
             </a:r>
             <a:r>
               <a:rPr lang="pt-BR" sz="1200" dirty="0"/>
-              <a:t>D0] [R</a:t>
+              <a:t>D</a:t>
+            </a:r>
+            <a:r>
+              <a:rPr lang="pt-BR" sz="1200" baseline="-25000" dirty="0"/>
+              <a:t>0</a:t>
+            </a:r>
+            <a:r>
+              <a:rPr lang="pt-BR" sz="1200" dirty="0"/>
+              <a:t>] [R</a:t>
             </a:r>
             <a:r>
               <a:rPr lang="pt-BR" sz="1200" baseline="-25000" dirty="0"/>
@@ -38439,6 +38369,810 @@
     <p:extLst>
       <p:ext uri="{BB962C8B-B14F-4D97-AF65-F5344CB8AC3E}">
         <p14:creationId xmlns:p14="http://schemas.microsoft.com/office/powerpoint/2010/main" val="327414696"/>
+      </p:ext>
+    </p:extLst>
+  </p:cSld>
+  <p:clrMapOvr>
+    <a:masterClrMapping/>
+  </p:clrMapOvr>
+</p:sld>
+</file>
+
+<file path=ppt/slides/slide43.xml><?xml version="1.0" encoding="utf-8"?>
+<p:sld xmlns:a="http://schemas.openxmlformats.org/drawingml/2006/main" xmlns:r="http://schemas.openxmlformats.org/officeDocument/2006/relationships" xmlns:p="http://schemas.openxmlformats.org/presentationml/2006/main">
+  <p:cSld>
+    <p:spTree>
+      <p:nvGrpSpPr>
+        <p:cNvPr id="1" name=""/>
+        <p:cNvGrpSpPr/>
+        <p:nvPr/>
+      </p:nvGrpSpPr>
+      <p:grpSpPr>
+        <a:xfrm>
+          <a:off x="0" y="0"/>
+          <a:ext cx="0" cy="0"/>
+          <a:chOff x="0" y="0"/>
+          <a:chExt cx="0" cy="0"/>
+        </a:xfrm>
+      </p:grpSpPr>
+      <p:sp>
+        <p:nvSpPr>
+          <p:cNvPr id="2" name="Title 1">
+            <a:extLst>
+              <a:ext uri="{FF2B5EF4-FFF2-40B4-BE49-F238E27FC236}">
+                <a16:creationId xmlns:a16="http://schemas.microsoft.com/office/drawing/2014/main" id="{317952A4-6853-43A0-9CC5-DA163180AEF2}"/>
+              </a:ext>
+            </a:extLst>
+          </p:cNvPr>
+          <p:cNvSpPr>
+            <a:spLocks noGrp="1"/>
+          </p:cNvSpPr>
+          <p:nvPr>
+            <p:ph type="title"/>
+          </p:nvPr>
+        </p:nvSpPr>
+        <p:spPr/>
+        <p:txBody>
+          <a:bodyPr/>
+          <a:lstStyle/>
+          <a:p>
+            <a:endParaRPr lang="en-US"/>
+          </a:p>
+        </p:txBody>
+      </p:sp>
+      <p:sp>
+        <p:nvSpPr>
+          <p:cNvPr id="3" name="Content Placeholder 2">
+            <a:extLst>
+              <a:ext uri="{FF2B5EF4-FFF2-40B4-BE49-F238E27FC236}">
+                <a16:creationId xmlns:a16="http://schemas.microsoft.com/office/drawing/2014/main" id="{574B13A9-5F1A-4282-B6E1-B460C4458C90}"/>
+              </a:ext>
+            </a:extLst>
+          </p:cNvPr>
+          <p:cNvSpPr>
+            <a:spLocks noGrp="1"/>
+          </p:cNvSpPr>
+          <p:nvPr>
+            <p:ph idx="1"/>
+          </p:nvPr>
+        </p:nvSpPr>
+        <p:spPr/>
+        <p:txBody>
+          <a:bodyPr>
+            <a:normAutofit/>
+          </a:bodyPr>
+          <a:lstStyle/>
+          <a:p>
+            <a:r>
+              <a:rPr lang="en-US" dirty="0"/>
+              <a:t>For 3x3 followed by 1x1 Ideally output will be 5x18x18</a:t>
+            </a:r>
+          </a:p>
+          <a:p>
+            <a:pPr lvl="1"/>
+            <a:r>
+              <a:rPr lang="pt-BR" sz="1400" dirty="0"/>
+              <a:t>[C</a:t>
+            </a:r>
+            <a:r>
+              <a:rPr lang="pt-BR" sz="1400" baseline="-25000" dirty="0"/>
+              <a:t>0</a:t>
+            </a:r>
+            <a:r>
+              <a:rPr lang="pt-BR" sz="1400" dirty="0"/>
+              <a:t>R</a:t>
+            </a:r>
+            <a:r>
+              <a:rPr lang="pt-BR" sz="1400" baseline="-25000" dirty="0"/>
+              <a:t>0</a:t>
+            </a:r>
+            <a:r>
+              <a:rPr lang="pt-BR" sz="1400" dirty="0"/>
+              <a:t>D</a:t>
+            </a:r>
+            <a:r>
+              <a:rPr lang="pt-BR" sz="1400" baseline="-25000" dirty="0"/>
+              <a:t>0</a:t>
+            </a:r>
+            <a:r>
+              <a:rPr lang="pt-BR" sz="1400" dirty="0"/>
+              <a:t>, C</a:t>
+            </a:r>
+            <a:r>
+              <a:rPr lang="pt-BR" sz="1400" baseline="-25000" dirty="0"/>
+              <a:t>0</a:t>
+            </a:r>
+            <a:r>
+              <a:rPr lang="pt-BR" sz="1400" dirty="0"/>
+              <a:t>R</a:t>
+            </a:r>
+            <a:r>
+              <a:rPr lang="pt-BR" sz="1400" baseline="-25000" dirty="0"/>
+              <a:t>0</a:t>
+            </a:r>
+            <a:r>
+              <a:rPr lang="pt-BR" sz="1400" dirty="0"/>
+              <a:t>D</a:t>
+            </a:r>
+            <a:r>
+              <a:rPr lang="pt-BR" sz="1400" baseline="-25000" dirty="0"/>
+              <a:t>1</a:t>
+            </a:r>
+            <a:r>
+              <a:rPr lang="pt-BR" sz="1400" dirty="0"/>
+              <a:t>, ... C</a:t>
+            </a:r>
+            <a:r>
+              <a:rPr lang="pt-BR" sz="1400" baseline="-25000" dirty="0"/>
+              <a:t>0</a:t>
+            </a:r>
+            <a:r>
+              <a:rPr lang="pt-BR" sz="1400" dirty="0"/>
+              <a:t>R</a:t>
+            </a:r>
+            <a:r>
+              <a:rPr lang="pt-BR" sz="1400" baseline="-25000" dirty="0"/>
+              <a:t>0</a:t>
+            </a:r>
+            <a:r>
+              <a:rPr lang="pt-BR" sz="1400" dirty="0"/>
+              <a:t>D</a:t>
+            </a:r>
+            <a:r>
+              <a:rPr lang="pt-BR" sz="1400" baseline="-25000" dirty="0"/>
+              <a:t>4</a:t>
+            </a:r>
+            <a:r>
+              <a:rPr lang="pt-BR" sz="1400" dirty="0"/>
+              <a:t>]</a:t>
+            </a:r>
+            <a:r>
+              <a:rPr lang="pt-BR" dirty="0"/>
+              <a:t> </a:t>
+            </a:r>
+            <a:r>
+              <a:rPr lang="pt-BR" sz="1400" dirty="0"/>
+              <a:t>[C</a:t>
+            </a:r>
+            <a:r>
+              <a:rPr lang="pt-BR" sz="1400" baseline="-25000" dirty="0"/>
+              <a:t>1</a:t>
+            </a:r>
+            <a:r>
+              <a:rPr lang="pt-BR" sz="1400" dirty="0"/>
+              <a:t>R</a:t>
+            </a:r>
+            <a:r>
+              <a:rPr lang="pt-BR" sz="1400" baseline="-25000" dirty="0"/>
+              <a:t>0</a:t>
+            </a:r>
+            <a:r>
+              <a:rPr lang="pt-BR" sz="1400" dirty="0"/>
+              <a:t>D</a:t>
+            </a:r>
+            <a:r>
+              <a:rPr lang="pt-BR" sz="1400" baseline="-25000" dirty="0"/>
+              <a:t>0</a:t>
+            </a:r>
+            <a:r>
+              <a:rPr lang="pt-BR" sz="1400" dirty="0"/>
+              <a:t>, C</a:t>
+            </a:r>
+            <a:r>
+              <a:rPr lang="pt-BR" sz="1400" baseline="-25000" dirty="0"/>
+              <a:t>1</a:t>
+            </a:r>
+            <a:r>
+              <a:rPr lang="pt-BR" sz="1400" dirty="0"/>
+              <a:t>R</a:t>
+            </a:r>
+            <a:r>
+              <a:rPr lang="pt-BR" sz="1400" baseline="-25000" dirty="0"/>
+              <a:t>0</a:t>
+            </a:r>
+            <a:r>
+              <a:rPr lang="pt-BR" sz="1400" dirty="0"/>
+              <a:t>D</a:t>
+            </a:r>
+            <a:r>
+              <a:rPr lang="pt-BR" sz="1400" baseline="-25000" dirty="0"/>
+              <a:t>1</a:t>
+            </a:r>
+            <a:r>
+              <a:rPr lang="pt-BR" sz="1400" dirty="0"/>
+              <a:t>, ... C</a:t>
+            </a:r>
+            <a:r>
+              <a:rPr lang="pt-BR" sz="1400" baseline="-25000" dirty="0"/>
+              <a:t>1</a:t>
+            </a:r>
+            <a:r>
+              <a:rPr lang="pt-BR" sz="1400" dirty="0"/>
+              <a:t>R</a:t>
+            </a:r>
+            <a:r>
+              <a:rPr lang="pt-BR" sz="1400" baseline="-25000" dirty="0"/>
+              <a:t>0</a:t>
+            </a:r>
+            <a:r>
+              <a:rPr lang="pt-BR" sz="1400" dirty="0"/>
+              <a:t>D</a:t>
+            </a:r>
+            <a:r>
+              <a:rPr lang="pt-BR" sz="1400" baseline="-25000" dirty="0"/>
+              <a:t>4</a:t>
+            </a:r>
+            <a:r>
+              <a:rPr lang="pt-BR" sz="1400" dirty="0"/>
+              <a:t>] ............ [C</a:t>
+            </a:r>
+            <a:r>
+              <a:rPr lang="pt-BR" sz="1400" baseline="-25000" dirty="0"/>
+              <a:t>19</a:t>
+            </a:r>
+            <a:r>
+              <a:rPr lang="pt-BR" sz="1400" dirty="0"/>
+              <a:t>R</a:t>
+            </a:r>
+            <a:r>
+              <a:rPr lang="pt-BR" sz="1400" baseline="-25000" dirty="0"/>
+              <a:t>0</a:t>
+            </a:r>
+            <a:r>
+              <a:rPr lang="pt-BR" sz="1400" dirty="0"/>
+              <a:t>D</a:t>
+            </a:r>
+            <a:r>
+              <a:rPr lang="pt-BR" sz="1400" baseline="-25000" dirty="0"/>
+              <a:t>0</a:t>
+            </a:r>
+            <a:r>
+              <a:rPr lang="pt-BR" sz="1400" dirty="0"/>
+              <a:t>, C</a:t>
+            </a:r>
+            <a:r>
+              <a:rPr lang="pt-BR" sz="1400" baseline="-25000" dirty="0"/>
+              <a:t>19</a:t>
+            </a:r>
+            <a:r>
+              <a:rPr lang="pt-BR" sz="1400" dirty="0"/>
+              <a:t>R</a:t>
+            </a:r>
+            <a:r>
+              <a:rPr lang="pt-BR" sz="1400" baseline="-25000" dirty="0"/>
+              <a:t>0</a:t>
+            </a:r>
+            <a:r>
+              <a:rPr lang="pt-BR" sz="1400" dirty="0"/>
+              <a:t>D</a:t>
+            </a:r>
+            <a:r>
+              <a:rPr lang="pt-BR" sz="1400" baseline="-25000" dirty="0"/>
+              <a:t>1</a:t>
+            </a:r>
+            <a:r>
+              <a:rPr lang="pt-BR" sz="1400" dirty="0"/>
+              <a:t>, ... C</a:t>
+            </a:r>
+            <a:r>
+              <a:rPr lang="pt-BR" sz="1400" baseline="-25000" dirty="0"/>
+              <a:t>19</a:t>
+            </a:r>
+            <a:r>
+              <a:rPr lang="pt-BR" sz="1400" dirty="0"/>
+              <a:t>R</a:t>
+            </a:r>
+            <a:r>
+              <a:rPr lang="pt-BR" sz="1400" baseline="-25000" dirty="0"/>
+              <a:t>0</a:t>
+            </a:r>
+            <a:r>
+              <a:rPr lang="pt-BR" sz="1400" dirty="0"/>
+              <a:t>D</a:t>
+            </a:r>
+            <a:r>
+              <a:rPr lang="pt-BR" sz="1400" baseline="-25000" dirty="0"/>
+              <a:t>4</a:t>
+            </a:r>
+            <a:r>
+              <a:rPr lang="pt-BR" sz="1400" dirty="0"/>
+              <a:t>]</a:t>
+            </a:r>
+          </a:p>
+          <a:p>
+            <a:pPr lvl="1"/>
+            <a:r>
+              <a:rPr lang="pt-BR" sz="1400" dirty="0"/>
+              <a:t>[C</a:t>
+            </a:r>
+            <a:r>
+              <a:rPr lang="pt-BR" sz="1400" baseline="-25000" dirty="0"/>
+              <a:t>0</a:t>
+            </a:r>
+            <a:r>
+              <a:rPr lang="pt-BR" sz="1400" dirty="0"/>
+              <a:t>R</a:t>
+            </a:r>
+            <a:r>
+              <a:rPr lang="pt-BR" sz="1400" baseline="-25000" dirty="0"/>
+              <a:t>1</a:t>
+            </a:r>
+            <a:r>
+              <a:rPr lang="pt-BR" sz="1400" dirty="0"/>
+              <a:t>D</a:t>
+            </a:r>
+            <a:r>
+              <a:rPr lang="pt-BR" sz="1400" baseline="-25000" dirty="0"/>
+              <a:t>0</a:t>
+            </a:r>
+            <a:r>
+              <a:rPr lang="pt-BR" sz="1400" dirty="0"/>
+              <a:t>, C</a:t>
+            </a:r>
+            <a:r>
+              <a:rPr lang="pt-BR" sz="1400" baseline="-25000" dirty="0"/>
+              <a:t>0</a:t>
+            </a:r>
+            <a:r>
+              <a:rPr lang="pt-BR" sz="1400" dirty="0"/>
+              <a:t>R</a:t>
+            </a:r>
+            <a:r>
+              <a:rPr lang="pt-BR" sz="1400" baseline="-25000" dirty="0"/>
+              <a:t>1</a:t>
+            </a:r>
+            <a:r>
+              <a:rPr lang="pt-BR" sz="1400" dirty="0"/>
+              <a:t>D</a:t>
+            </a:r>
+            <a:r>
+              <a:rPr lang="pt-BR" sz="1400" baseline="-25000" dirty="0"/>
+              <a:t>1</a:t>
+            </a:r>
+            <a:r>
+              <a:rPr lang="pt-BR" sz="1400" dirty="0"/>
+              <a:t>, ... C</a:t>
+            </a:r>
+            <a:r>
+              <a:rPr lang="pt-BR" sz="1400" baseline="-25000" dirty="0"/>
+              <a:t>0</a:t>
+            </a:r>
+            <a:r>
+              <a:rPr lang="pt-BR" sz="1400" dirty="0"/>
+              <a:t>R</a:t>
+            </a:r>
+            <a:r>
+              <a:rPr lang="pt-BR" sz="1400" baseline="-25000" dirty="0"/>
+              <a:t>1</a:t>
+            </a:r>
+            <a:r>
+              <a:rPr lang="pt-BR" sz="1400" dirty="0"/>
+              <a:t>D</a:t>
+            </a:r>
+            <a:r>
+              <a:rPr lang="pt-BR" sz="1400" baseline="-25000" dirty="0"/>
+              <a:t>4</a:t>
+            </a:r>
+            <a:r>
+              <a:rPr lang="pt-BR" sz="1400" dirty="0"/>
+              <a:t>] [C</a:t>
+            </a:r>
+            <a:r>
+              <a:rPr lang="pt-BR" sz="1400" baseline="-25000" dirty="0"/>
+              <a:t>1</a:t>
+            </a:r>
+            <a:r>
+              <a:rPr lang="pt-BR" sz="1400" dirty="0"/>
+              <a:t>R</a:t>
+            </a:r>
+            <a:r>
+              <a:rPr lang="pt-BR" sz="1400" baseline="-25000" dirty="0"/>
+              <a:t>1</a:t>
+            </a:r>
+            <a:r>
+              <a:rPr lang="pt-BR" sz="1400" dirty="0"/>
+              <a:t>D</a:t>
+            </a:r>
+            <a:r>
+              <a:rPr lang="pt-BR" sz="1400" baseline="-25000" dirty="0"/>
+              <a:t>0</a:t>
+            </a:r>
+            <a:r>
+              <a:rPr lang="pt-BR" sz="1400" dirty="0"/>
+              <a:t>, C</a:t>
+            </a:r>
+            <a:r>
+              <a:rPr lang="pt-BR" sz="1400" baseline="-25000" dirty="0"/>
+              <a:t>1</a:t>
+            </a:r>
+            <a:r>
+              <a:rPr lang="pt-BR" sz="1400" dirty="0"/>
+              <a:t>R</a:t>
+            </a:r>
+            <a:r>
+              <a:rPr lang="pt-BR" sz="1400" baseline="-25000" dirty="0"/>
+              <a:t>1</a:t>
+            </a:r>
+            <a:r>
+              <a:rPr lang="pt-BR" sz="1400" dirty="0"/>
+              <a:t>D</a:t>
+            </a:r>
+            <a:r>
+              <a:rPr lang="pt-BR" sz="1400" baseline="-25000" dirty="0"/>
+              <a:t>1</a:t>
+            </a:r>
+            <a:r>
+              <a:rPr lang="pt-BR" sz="1400" dirty="0"/>
+              <a:t>, ... C</a:t>
+            </a:r>
+            <a:r>
+              <a:rPr lang="pt-BR" sz="1400" baseline="-25000" dirty="0"/>
+              <a:t>1</a:t>
+            </a:r>
+            <a:r>
+              <a:rPr lang="pt-BR" sz="1400" dirty="0"/>
+              <a:t>R</a:t>
+            </a:r>
+            <a:r>
+              <a:rPr lang="pt-BR" sz="1400" baseline="-25000" dirty="0"/>
+              <a:t>1</a:t>
+            </a:r>
+            <a:r>
+              <a:rPr lang="pt-BR" sz="1400" dirty="0"/>
+              <a:t>D</a:t>
+            </a:r>
+            <a:r>
+              <a:rPr lang="pt-BR" sz="1400" baseline="-25000" dirty="0"/>
+              <a:t>4</a:t>
+            </a:r>
+            <a:r>
+              <a:rPr lang="pt-BR" sz="1400" dirty="0"/>
+              <a:t>] ............ [C</a:t>
+            </a:r>
+            <a:r>
+              <a:rPr lang="pt-BR" sz="1400" baseline="-25000" dirty="0"/>
+              <a:t>19</a:t>
+            </a:r>
+            <a:r>
+              <a:rPr lang="pt-BR" sz="1400" dirty="0"/>
+              <a:t>R</a:t>
+            </a:r>
+            <a:r>
+              <a:rPr lang="pt-BR" sz="1400" baseline="-25000" dirty="0"/>
+              <a:t>1</a:t>
+            </a:r>
+            <a:r>
+              <a:rPr lang="pt-BR" sz="1400" dirty="0"/>
+              <a:t>D</a:t>
+            </a:r>
+            <a:r>
+              <a:rPr lang="pt-BR" sz="1400" baseline="-25000" dirty="0"/>
+              <a:t>0</a:t>
+            </a:r>
+            <a:r>
+              <a:rPr lang="pt-BR" sz="1400" dirty="0"/>
+              <a:t>, C</a:t>
+            </a:r>
+            <a:r>
+              <a:rPr lang="pt-BR" sz="1400" baseline="-25000" dirty="0"/>
+              <a:t>19</a:t>
+            </a:r>
+            <a:r>
+              <a:rPr lang="pt-BR" sz="1400" dirty="0"/>
+              <a:t>R</a:t>
+            </a:r>
+            <a:r>
+              <a:rPr lang="pt-BR" sz="1400" baseline="-25000" dirty="0"/>
+              <a:t>1</a:t>
+            </a:r>
+            <a:r>
+              <a:rPr lang="pt-BR" sz="1400" dirty="0"/>
+              <a:t>D</a:t>
+            </a:r>
+            <a:r>
+              <a:rPr lang="pt-BR" sz="1400" baseline="-25000" dirty="0"/>
+              <a:t>1</a:t>
+            </a:r>
+            <a:r>
+              <a:rPr lang="pt-BR" sz="1400" dirty="0"/>
+              <a:t>, ... C</a:t>
+            </a:r>
+            <a:r>
+              <a:rPr lang="pt-BR" sz="1400" baseline="-25000" dirty="0"/>
+              <a:t>19</a:t>
+            </a:r>
+            <a:r>
+              <a:rPr lang="pt-BR" sz="1400" dirty="0"/>
+              <a:t>R</a:t>
+            </a:r>
+            <a:r>
+              <a:rPr lang="pt-BR" sz="1400" baseline="-25000" dirty="0"/>
+              <a:t>1</a:t>
+            </a:r>
+            <a:r>
+              <a:rPr lang="pt-BR" sz="1400" dirty="0"/>
+              <a:t>D</a:t>
+            </a:r>
+            <a:r>
+              <a:rPr lang="pt-BR" sz="1400" baseline="-25000" dirty="0"/>
+              <a:t>4</a:t>
+            </a:r>
+            <a:r>
+              <a:rPr lang="pt-BR" sz="1400" dirty="0"/>
+              <a:t>]</a:t>
+            </a:r>
+            <a:endParaRPr lang="en-US" sz="1400" dirty="0"/>
+          </a:p>
+          <a:p>
+            <a:pPr lvl="1"/>
+            <a:r>
+              <a:rPr lang="en-US" sz="1400" dirty="0"/>
+              <a:t>.</a:t>
+            </a:r>
+          </a:p>
+          <a:p>
+            <a:pPr lvl="1"/>
+            <a:r>
+              <a:rPr lang="en-US" sz="1400" dirty="0"/>
+              <a:t>.</a:t>
+            </a:r>
+          </a:p>
+          <a:p>
+            <a:pPr lvl="1"/>
+            <a:r>
+              <a:rPr lang="en-US" sz="1400" dirty="0"/>
+              <a:t>.</a:t>
+            </a:r>
+          </a:p>
+          <a:p>
+            <a:pPr lvl="1"/>
+            <a:r>
+              <a:rPr lang="pt-BR" sz="1400" dirty="0"/>
+              <a:t>[C</a:t>
+            </a:r>
+            <a:r>
+              <a:rPr lang="pt-BR" sz="1400" baseline="-25000" dirty="0"/>
+              <a:t>0</a:t>
+            </a:r>
+            <a:r>
+              <a:rPr lang="pt-BR" sz="1400" dirty="0"/>
+              <a:t>R</a:t>
+            </a:r>
+            <a:r>
+              <a:rPr lang="pt-BR" sz="1400" baseline="-25000" dirty="0"/>
+              <a:t>17</a:t>
+            </a:r>
+            <a:r>
+              <a:rPr lang="pt-BR" sz="1400" dirty="0"/>
+              <a:t>D</a:t>
+            </a:r>
+            <a:r>
+              <a:rPr lang="pt-BR" sz="1400" baseline="-25000" dirty="0"/>
+              <a:t>0</a:t>
+            </a:r>
+            <a:r>
+              <a:rPr lang="pt-BR" sz="1400"/>
+              <a:t>, C</a:t>
+            </a:r>
+            <a:r>
+              <a:rPr lang="pt-BR" sz="1400" baseline="-25000"/>
+              <a:t>0</a:t>
+            </a:r>
+            <a:r>
+              <a:rPr lang="pt-BR" sz="1400"/>
+              <a:t>R</a:t>
+            </a:r>
+            <a:r>
+              <a:rPr lang="pt-BR" sz="1400" baseline="-25000"/>
+              <a:t>1</a:t>
+            </a:r>
+            <a:r>
+              <a:rPr lang="pt-BR" sz="1400" baseline="-25000" dirty="0"/>
+              <a:t>7</a:t>
+            </a:r>
+            <a:r>
+              <a:rPr lang="pt-BR" sz="1400"/>
+              <a:t>D</a:t>
+            </a:r>
+            <a:r>
+              <a:rPr lang="pt-BR" sz="1400" baseline="-25000"/>
+              <a:t>1</a:t>
+            </a:r>
+            <a:r>
+              <a:rPr lang="pt-BR" sz="1400" dirty="0"/>
+              <a:t>, ... C</a:t>
+            </a:r>
+            <a:r>
+              <a:rPr lang="pt-BR" sz="1400" baseline="-25000" dirty="0"/>
+              <a:t>0</a:t>
+            </a:r>
+            <a:r>
+              <a:rPr lang="pt-BR" sz="1400" dirty="0"/>
+              <a:t>R</a:t>
+            </a:r>
+            <a:r>
+              <a:rPr lang="pt-BR" sz="1400" baseline="-25000" dirty="0"/>
+              <a:t>17</a:t>
+            </a:r>
+            <a:r>
+              <a:rPr lang="pt-BR" sz="1400" dirty="0"/>
+              <a:t>D</a:t>
+            </a:r>
+            <a:r>
+              <a:rPr lang="pt-BR" sz="1400" baseline="-25000" dirty="0"/>
+              <a:t>4</a:t>
+            </a:r>
+            <a:r>
+              <a:rPr lang="pt-BR" sz="1400" dirty="0"/>
+              <a:t>] [C</a:t>
+            </a:r>
+            <a:r>
+              <a:rPr lang="pt-BR" sz="1400" baseline="-25000" dirty="0"/>
+              <a:t>1</a:t>
+            </a:r>
+            <a:r>
+              <a:rPr lang="pt-BR" sz="1400" dirty="0"/>
+              <a:t>R</a:t>
+            </a:r>
+            <a:r>
+              <a:rPr lang="pt-BR" sz="1400" baseline="-25000" dirty="0"/>
+              <a:t>17</a:t>
+            </a:r>
+            <a:r>
+              <a:rPr lang="pt-BR" sz="1400" dirty="0"/>
+              <a:t>D</a:t>
+            </a:r>
+            <a:r>
+              <a:rPr lang="pt-BR" sz="1400" baseline="-25000" dirty="0"/>
+              <a:t>0</a:t>
+            </a:r>
+            <a:r>
+              <a:rPr lang="pt-BR" sz="1400" dirty="0"/>
+              <a:t>, C</a:t>
+            </a:r>
+            <a:r>
+              <a:rPr lang="pt-BR" sz="1400" baseline="-25000" dirty="0"/>
+              <a:t>1</a:t>
+            </a:r>
+            <a:r>
+              <a:rPr lang="pt-BR" sz="1400" dirty="0"/>
+              <a:t>R</a:t>
+            </a:r>
+            <a:r>
+              <a:rPr lang="pt-BR" sz="1400" baseline="-25000" dirty="0"/>
+              <a:t>17</a:t>
+            </a:r>
+            <a:r>
+              <a:rPr lang="pt-BR" sz="1400" dirty="0"/>
+              <a:t>D</a:t>
+            </a:r>
+            <a:r>
+              <a:rPr lang="pt-BR" sz="1400" baseline="-25000" dirty="0"/>
+              <a:t>1</a:t>
+            </a:r>
+            <a:r>
+              <a:rPr lang="pt-BR" sz="1400" dirty="0"/>
+              <a:t>, ... C</a:t>
+            </a:r>
+            <a:r>
+              <a:rPr lang="pt-BR" sz="1400" baseline="-25000" dirty="0"/>
+              <a:t>1</a:t>
+            </a:r>
+            <a:r>
+              <a:rPr lang="pt-BR" sz="1400" dirty="0"/>
+              <a:t>R</a:t>
+            </a:r>
+            <a:r>
+              <a:rPr lang="pt-BR" sz="1400" baseline="-25000" dirty="0"/>
+              <a:t>17</a:t>
+            </a:r>
+            <a:r>
+              <a:rPr lang="pt-BR" sz="1400" dirty="0"/>
+              <a:t>D</a:t>
+            </a:r>
+            <a:r>
+              <a:rPr lang="pt-BR" sz="1400" baseline="-25000" dirty="0"/>
+              <a:t>4</a:t>
+            </a:r>
+            <a:r>
+              <a:rPr lang="pt-BR" sz="1400" dirty="0"/>
+              <a:t>] ............ [C</a:t>
+            </a:r>
+            <a:r>
+              <a:rPr lang="pt-BR" sz="1400" baseline="-25000" dirty="0"/>
+              <a:t>19</a:t>
+            </a:r>
+            <a:r>
+              <a:rPr lang="pt-BR" sz="1400" dirty="0"/>
+              <a:t>R</a:t>
+            </a:r>
+            <a:r>
+              <a:rPr lang="pt-BR" sz="1400" baseline="-25000" dirty="0"/>
+              <a:t>17</a:t>
+            </a:r>
+            <a:r>
+              <a:rPr lang="pt-BR" sz="1400" dirty="0"/>
+              <a:t>D</a:t>
+            </a:r>
+            <a:r>
+              <a:rPr lang="pt-BR" sz="1400" baseline="-25000" dirty="0"/>
+              <a:t>0</a:t>
+            </a:r>
+            <a:r>
+              <a:rPr lang="pt-BR" sz="1400" dirty="0"/>
+              <a:t>, C</a:t>
+            </a:r>
+            <a:r>
+              <a:rPr lang="pt-BR" sz="1400" baseline="-25000" dirty="0"/>
+              <a:t>19</a:t>
+            </a:r>
+            <a:r>
+              <a:rPr lang="pt-BR" sz="1400" dirty="0"/>
+              <a:t>R</a:t>
+            </a:r>
+            <a:r>
+              <a:rPr lang="pt-BR" sz="1400" baseline="-25000" dirty="0"/>
+              <a:t>17</a:t>
+            </a:r>
+            <a:r>
+              <a:rPr lang="pt-BR" sz="1400" dirty="0"/>
+              <a:t>D</a:t>
+            </a:r>
+            <a:r>
+              <a:rPr lang="pt-BR" sz="1400" baseline="-25000" dirty="0"/>
+              <a:t>1</a:t>
+            </a:r>
+            <a:r>
+              <a:rPr lang="pt-BR" sz="1400" dirty="0"/>
+              <a:t>, ... C</a:t>
+            </a:r>
+            <a:r>
+              <a:rPr lang="pt-BR" sz="1400" baseline="-25000" dirty="0"/>
+              <a:t>19</a:t>
+            </a:r>
+            <a:r>
+              <a:rPr lang="pt-BR" sz="1400" dirty="0"/>
+              <a:t>R</a:t>
+            </a:r>
+            <a:r>
+              <a:rPr lang="pt-BR" sz="1400" baseline="-25000" dirty="0"/>
+              <a:t>17</a:t>
+            </a:r>
+            <a:r>
+              <a:rPr lang="pt-BR" sz="1400" dirty="0"/>
+              <a:t>D</a:t>
+            </a:r>
+            <a:r>
+              <a:rPr lang="pt-BR" sz="1400" baseline="-25000" dirty="0"/>
+              <a:t>4</a:t>
+            </a:r>
+            <a:r>
+              <a:rPr lang="pt-BR" sz="1400" dirty="0"/>
+              <a:t>]</a:t>
+            </a:r>
+            <a:endParaRPr lang="en-US" sz="1400" dirty="0"/>
+          </a:p>
+          <a:p>
+            <a:pPr lvl="1"/>
+            <a:endParaRPr lang="en-US" sz="1400" dirty="0"/>
+          </a:p>
+          <a:p>
+            <a:pPr lvl="1"/>
+            <a:endParaRPr lang="en-US" sz="1400" dirty="0"/>
+          </a:p>
+          <a:p>
+            <a:pPr lvl="1"/>
+            <a:endParaRPr lang="en-US" dirty="0"/>
+          </a:p>
+          <a:p>
+            <a:endParaRPr lang="en-US" dirty="0"/>
+          </a:p>
+        </p:txBody>
+      </p:sp>
+    </p:spTree>
+    <p:extLst>
+      <p:ext uri="{BB962C8B-B14F-4D97-AF65-F5344CB8AC3E}">
+        <p14:creationId xmlns:p14="http://schemas.microsoft.com/office/powerpoint/2010/main" val="1872266314"/>
       </p:ext>
     </p:extLst>
   </p:cSld>

</xml_diff>